<commit_message>
Added new figure file Figures - Sparagon and Arts et al.  2022_11_07.pdf Updated Sig ASVs mod.deseq4 v1.pptx and associated figure Sig ASVs mod.deseq4 v1.png.
</commit_message>
<xml_diff>
--- a/figures/Sig ASVs mod.deseq4 v1.pptx
+++ b/figures/Sig ASVs mod.deseq4 v1.pptx
@@ -245,7 +245,7 @@
           <a:p>
             <a:fld id="{6E3ADA4A-3132-471B-AC99-0A34C065C717}" type="datetimeFigureOut">
               <a:rPr lang="en-US" smtClean="0"/>
-              <a:t>7/1/2022</a:t>
+              <a:t>11/7/2022</a:t>
             </a:fld>
             <a:endParaRPr lang="en-US"/>
           </a:p>
@@ -415,7 +415,7 @@
           <a:p>
             <a:fld id="{6E3ADA4A-3132-471B-AC99-0A34C065C717}" type="datetimeFigureOut">
               <a:rPr lang="en-US" smtClean="0"/>
-              <a:t>7/1/2022</a:t>
+              <a:t>11/7/2022</a:t>
             </a:fld>
             <a:endParaRPr lang="en-US"/>
           </a:p>
@@ -595,7 +595,7 @@
           <a:p>
             <a:fld id="{6E3ADA4A-3132-471B-AC99-0A34C065C717}" type="datetimeFigureOut">
               <a:rPr lang="en-US" smtClean="0"/>
-              <a:t>7/1/2022</a:t>
+              <a:t>11/7/2022</a:t>
             </a:fld>
             <a:endParaRPr lang="en-US"/>
           </a:p>
@@ -1124,7 +1124,7 @@
           <a:p>
             <a:fld id="{6E3ADA4A-3132-471B-AC99-0A34C065C717}" type="datetimeFigureOut">
               <a:rPr lang="en-US" smtClean="0"/>
-              <a:t>7/1/2022</a:t>
+              <a:t>11/7/2022</a:t>
             </a:fld>
             <a:endParaRPr lang="en-US"/>
           </a:p>
@@ -1368,7 +1368,7 @@
           <a:p>
             <a:fld id="{6E3ADA4A-3132-471B-AC99-0A34C065C717}" type="datetimeFigureOut">
               <a:rPr lang="en-US" smtClean="0"/>
-              <a:t>7/1/2022</a:t>
+              <a:t>11/7/2022</a:t>
             </a:fld>
             <a:endParaRPr lang="en-US"/>
           </a:p>
@@ -1600,7 +1600,7 @@
           <a:p>
             <a:fld id="{6E3ADA4A-3132-471B-AC99-0A34C065C717}" type="datetimeFigureOut">
               <a:rPr lang="en-US" smtClean="0"/>
-              <a:t>7/1/2022</a:t>
+              <a:t>11/7/2022</a:t>
             </a:fld>
             <a:endParaRPr lang="en-US"/>
           </a:p>
@@ -1967,7 +1967,7 @@
           <a:p>
             <a:fld id="{6E3ADA4A-3132-471B-AC99-0A34C065C717}" type="datetimeFigureOut">
               <a:rPr lang="en-US" smtClean="0"/>
-              <a:t>7/1/2022</a:t>
+              <a:t>11/7/2022</a:t>
             </a:fld>
             <a:endParaRPr lang="en-US"/>
           </a:p>
@@ -2085,7 +2085,7 @@
           <a:p>
             <a:fld id="{6E3ADA4A-3132-471B-AC99-0A34C065C717}" type="datetimeFigureOut">
               <a:rPr lang="en-US" smtClean="0"/>
-              <a:t>7/1/2022</a:t>
+              <a:t>11/7/2022</a:t>
             </a:fld>
             <a:endParaRPr lang="en-US"/>
           </a:p>
@@ -2180,7 +2180,7 @@
           <a:p>
             <a:fld id="{6E3ADA4A-3132-471B-AC99-0A34C065C717}" type="datetimeFigureOut">
               <a:rPr lang="en-US" smtClean="0"/>
-              <a:t>7/1/2022</a:t>
+              <a:t>11/7/2022</a:t>
             </a:fld>
             <a:endParaRPr lang="en-US"/>
           </a:p>
@@ -2457,7 +2457,7 @@
           <a:p>
             <a:fld id="{6E3ADA4A-3132-471B-AC99-0A34C065C717}" type="datetimeFigureOut">
               <a:rPr lang="en-US" smtClean="0"/>
-              <a:t>7/1/2022</a:t>
+              <a:t>11/7/2022</a:t>
             </a:fld>
             <a:endParaRPr lang="en-US"/>
           </a:p>
@@ -2714,7 +2714,7 @@
           <a:p>
             <a:fld id="{6E3ADA4A-3132-471B-AC99-0A34C065C717}" type="datetimeFigureOut">
               <a:rPr lang="en-US" smtClean="0"/>
-              <a:t>7/1/2022</a:t>
+              <a:t>11/7/2022</a:t>
             </a:fld>
             <a:endParaRPr lang="en-US"/>
           </a:p>
@@ -2927,7 +2927,7 @@
           <a:p>
             <a:fld id="{6E3ADA4A-3132-471B-AC99-0A34C065C717}" type="datetimeFigureOut">
               <a:rPr lang="en-US" smtClean="0"/>
-              <a:t>7/1/2022</a:t>
+              <a:t>11/7/2022</a:t>
             </a:fld>
             <a:endParaRPr lang="en-US"/>
           </a:p>
@@ -4213,7 +4213,7 @@
         </p:nvGrpSpPr>
         <p:grpSpPr>
           <a:xfrm>
-            <a:off x="628824" y="8617986"/>
+            <a:off x="7529557" y="8695702"/>
             <a:ext cx="6728383" cy="7341883"/>
             <a:chOff x="16768706" y="8443570"/>
             <a:chExt cx="6607375" cy="7341883"/>
@@ -4352,7 +4352,7 @@
         </p:nvGrpSpPr>
         <p:grpSpPr>
           <a:xfrm>
-            <a:off x="7634769" y="8426106"/>
+            <a:off x="274494" y="8460523"/>
             <a:ext cx="6711408" cy="9932719"/>
             <a:chOff x="7796131" y="21227695"/>
             <a:chExt cx="6711408" cy="9932719"/>
@@ -5802,12 +5802,49 @@
           </a:p>
         </p:txBody>
       </p:sp>
+      <p:sp>
+        <p:nvSpPr>
+          <p:cNvPr id="70" name="TextBox 69">
+            <a:extLst>
+              <a:ext uri="{FF2B5EF4-FFF2-40B4-BE49-F238E27FC236}">
+                <a16:creationId xmlns:a16="http://schemas.microsoft.com/office/drawing/2014/main" id="{0D9A635C-5091-7F9A-75E0-A2869CE41923}"/>
+              </a:ext>
+            </a:extLst>
+          </p:cNvPr>
+          <p:cNvSpPr txBox="1"/>
+          <p:nvPr/>
+        </p:nvSpPr>
+        <p:spPr>
+          <a:xfrm>
+            <a:off x="9364018" y="21670386"/>
+            <a:ext cx="9636973" cy="1569660"/>
+          </a:xfrm>
+          <a:prstGeom prst="rect">
+            <a:avLst/>
+          </a:prstGeom>
+          <a:noFill/>
+        </p:spPr>
+        <p:txBody>
+          <a:bodyPr wrap="square" rtlCol="0">
+            <a:spAutoFit/>
+          </a:bodyPr>
+          <a:lstStyle/>
+          <a:p>
+            <a:pPr algn="ctr"/>
+            <a:r>
+              <a:rPr lang="en-US" sz="9600" b="1" u="sng" dirty="0"/>
+              <a:t>ASVs Depleted In:</a:t>
+            </a:r>
+            <a:endParaRPr lang="en-US" sz="11500" b="1" u="sng" dirty="0"/>
+          </a:p>
+        </p:txBody>
+      </p:sp>
       <p:grpSp>
         <p:nvGrpSpPr>
-          <p:cNvPr id="31" name="Group 30">
+          <p:cNvPr id="2" name="Group 1">
             <a:extLst>
               <a:ext uri="{FF2B5EF4-FFF2-40B4-BE49-F238E27FC236}">
-                <a16:creationId xmlns:a16="http://schemas.microsoft.com/office/drawing/2014/main" id="{0B8751CB-862C-8DE9-BB62-608B07D1EB22}"/>
+                <a16:creationId xmlns:a16="http://schemas.microsoft.com/office/drawing/2014/main" id="{CF7C7135-FADA-EB8F-58C7-8C3ED46AA8A2}"/>
               </a:ext>
             </a:extLst>
           </p:cNvPr>
@@ -5816,7 +5853,7 @@
         </p:nvGrpSpPr>
         <p:grpSpPr>
           <a:xfrm>
-            <a:off x="516718" y="25195021"/>
+            <a:off x="7529557" y="25454851"/>
             <a:ext cx="6728383" cy="7341883"/>
             <a:chOff x="16768706" y="8443570"/>
             <a:chExt cx="6607375" cy="7341883"/>
@@ -5824,10 +5861,10 @@
         </p:grpSpPr>
         <p:grpSp>
           <p:nvGrpSpPr>
-            <p:cNvPr id="33" name="Group 32">
+            <p:cNvPr id="4" name="Group 3">
               <a:extLst>
                 <a:ext uri="{FF2B5EF4-FFF2-40B4-BE49-F238E27FC236}">
-                  <a16:creationId xmlns:a16="http://schemas.microsoft.com/office/drawing/2014/main" id="{FC76EEC7-6756-EAFE-B73B-E906F879D286}"/>
+                  <a16:creationId xmlns:a16="http://schemas.microsoft.com/office/drawing/2014/main" id="{464140F8-A688-64D6-85F6-077E808FFE89}"/>
                 </a:ext>
               </a:extLst>
             </p:cNvPr>
@@ -5844,10 +5881,10 @@
           </p:grpSpPr>
           <p:pic>
             <p:nvPicPr>
-              <p:cNvPr id="36" name="Picture 35" descr="Graphical user interface, chart, box and whisker chart&#10;&#10;Description automatically generated">
+              <p:cNvPr id="8" name="Picture 7" descr="Graphical user interface, chart, box and whisker chart&#10;&#10;Description automatically generated">
                 <a:extLst>
                   <a:ext uri="{FF2B5EF4-FFF2-40B4-BE49-F238E27FC236}">
-                    <a16:creationId xmlns:a16="http://schemas.microsoft.com/office/drawing/2014/main" id="{C171AC8B-BE7A-544A-919F-A73552A669AD}"/>
+                    <a16:creationId xmlns:a16="http://schemas.microsoft.com/office/drawing/2014/main" id="{0E421DA5-A1F0-8BF5-A4C3-01AE0E97F869}"/>
                   </a:ext>
                 </a:extLst>
               </p:cNvPr>
@@ -5876,10 +5913,10 @@
           </p:pic>
           <p:pic>
             <p:nvPicPr>
-              <p:cNvPr id="37" name="Picture 36" descr="Chart, box and whisker chart&#10;&#10;Description automatically generated">
+              <p:cNvPr id="9" name="Picture 8" descr="Chart, box and whisker chart&#10;&#10;Description automatically generated">
                 <a:extLst>
                   <a:ext uri="{FF2B5EF4-FFF2-40B4-BE49-F238E27FC236}">
-                    <a16:creationId xmlns:a16="http://schemas.microsoft.com/office/drawing/2014/main" id="{C7D3A7C1-2D7E-5446-4050-3E6A4EF5A4F7}"/>
+                    <a16:creationId xmlns:a16="http://schemas.microsoft.com/office/drawing/2014/main" id="{C2988B79-4ACA-62E0-5B82-57B824752E9A}"/>
                   </a:ext>
                 </a:extLst>
               </p:cNvPr>
@@ -5906,10 +5943,10 @@
         </p:grpSp>
         <p:sp>
           <p:nvSpPr>
-            <p:cNvPr id="34" name="TextBox 33">
+            <p:cNvPr id="5" name="TextBox 4">
               <a:extLst>
                 <a:ext uri="{FF2B5EF4-FFF2-40B4-BE49-F238E27FC236}">
-                  <a16:creationId xmlns:a16="http://schemas.microsoft.com/office/drawing/2014/main" id="{04E14B26-D3BB-EBC3-D1B8-3DC2BF73AEC8}"/>
+                  <a16:creationId xmlns:a16="http://schemas.microsoft.com/office/drawing/2014/main" id="{0F3EF75F-A0DD-CB34-03CF-435D4A025B82}"/>
                 </a:ext>
               </a:extLst>
             </p:cNvPr>
@@ -5943,10 +5980,10 @@
       </p:grpSp>
       <p:grpSp>
         <p:nvGrpSpPr>
-          <p:cNvPr id="38" name="Group 37">
+          <p:cNvPr id="10" name="Group 9">
             <a:extLst>
               <a:ext uri="{FF2B5EF4-FFF2-40B4-BE49-F238E27FC236}">
-                <a16:creationId xmlns:a16="http://schemas.microsoft.com/office/drawing/2014/main" id="{5F9B4CED-9DAE-B0AF-0787-8BE9C731C10D}"/>
+                <a16:creationId xmlns:a16="http://schemas.microsoft.com/office/drawing/2014/main" id="{ABCDC33C-7E5A-4393-960F-CDDB428E85CC}"/>
               </a:ext>
             </a:extLst>
           </p:cNvPr>
@@ -5955,7 +5992,7 @@
         </p:nvGrpSpPr>
         <p:grpSpPr>
           <a:xfrm>
-            <a:off x="7522662" y="25003141"/>
+            <a:off x="443829" y="25151944"/>
             <a:ext cx="6711408" cy="9932719"/>
             <a:chOff x="7796131" y="21227695"/>
             <a:chExt cx="6711408" cy="9932719"/>
@@ -5963,10 +6000,10 @@
         </p:grpSpPr>
         <p:grpSp>
           <p:nvGrpSpPr>
-            <p:cNvPr id="40" name="Group 39">
+            <p:cNvPr id="11" name="Group 10">
               <a:extLst>
                 <a:ext uri="{FF2B5EF4-FFF2-40B4-BE49-F238E27FC236}">
-                  <a16:creationId xmlns:a16="http://schemas.microsoft.com/office/drawing/2014/main" id="{E9F8EB61-5488-CEAF-EA5D-1DFD042CE5BF}"/>
+                  <a16:creationId xmlns:a16="http://schemas.microsoft.com/office/drawing/2014/main" id="{B727BE64-D9BA-8389-E402-2375ECF2DC2A}"/>
                 </a:ext>
               </a:extLst>
             </p:cNvPr>
@@ -5983,10 +6020,10 @@
           </p:grpSpPr>
           <p:grpSp>
             <p:nvGrpSpPr>
-              <p:cNvPr id="42" name="Group 41">
+              <p:cNvPr id="15" name="Group 14">
                 <a:extLst>
                   <a:ext uri="{FF2B5EF4-FFF2-40B4-BE49-F238E27FC236}">
-                    <a16:creationId xmlns:a16="http://schemas.microsoft.com/office/drawing/2014/main" id="{705232E9-C2A1-1340-8C3D-18AC44964F9B}"/>
+                    <a16:creationId xmlns:a16="http://schemas.microsoft.com/office/drawing/2014/main" id="{80B7A1C8-D022-D352-315B-075427CA9251}"/>
                   </a:ext>
                 </a:extLst>
               </p:cNvPr>
@@ -6003,10 +6040,10 @@
             </p:grpSpPr>
             <p:pic>
               <p:nvPicPr>
-                <p:cNvPr id="45" name="Picture 44" descr="Bar chart&#10;&#10;Description automatically generated with low confidence">
+                <p:cNvPr id="21" name="Picture 20" descr="Bar chart&#10;&#10;Description automatically generated with low confidence">
                   <a:extLst>
                     <a:ext uri="{FF2B5EF4-FFF2-40B4-BE49-F238E27FC236}">
-                      <a16:creationId xmlns:a16="http://schemas.microsoft.com/office/drawing/2014/main" id="{F2D441CC-AC61-7C33-630C-F8DDAABEC68E}"/>
+                      <a16:creationId xmlns:a16="http://schemas.microsoft.com/office/drawing/2014/main" id="{F5E7CF39-BB50-7774-5149-AE6FCBADEC76}"/>
                     </a:ext>
                   </a:extLst>
                 </p:cNvPr>
@@ -6035,10 +6072,10 @@
             </p:pic>
             <p:pic>
               <p:nvPicPr>
-                <p:cNvPr id="46" name="Picture 45" descr="Graphical user interface, chart, box and whisker chart&#10;&#10;Description automatically generated">
+                <p:cNvPr id="22" name="Picture 21" descr="Graphical user interface, chart, box and whisker chart&#10;&#10;Description automatically generated">
                   <a:extLst>
                     <a:ext uri="{FF2B5EF4-FFF2-40B4-BE49-F238E27FC236}">
-                      <a16:creationId xmlns:a16="http://schemas.microsoft.com/office/drawing/2014/main" id="{EE7B081E-D4C0-D242-3815-798AFC559812}"/>
+                      <a16:creationId xmlns:a16="http://schemas.microsoft.com/office/drawing/2014/main" id="{DD6EE913-73C7-7ED3-AC1A-94B0595C7473}"/>
                     </a:ext>
                   </a:extLst>
                 </p:cNvPr>
@@ -6068,10 +6105,10 @@
           </p:grpSp>
           <p:sp>
             <p:nvSpPr>
-              <p:cNvPr id="44" name="TextBox 43">
+              <p:cNvPr id="19" name="TextBox 18">
                 <a:extLst>
                   <a:ext uri="{FF2B5EF4-FFF2-40B4-BE49-F238E27FC236}">
-                    <a16:creationId xmlns:a16="http://schemas.microsoft.com/office/drawing/2014/main" id="{EF17DBE5-4216-3DAE-97C8-C6DA64D91EBC}"/>
+                    <a16:creationId xmlns:a16="http://schemas.microsoft.com/office/drawing/2014/main" id="{39151832-2ED4-4E71-58A7-CC5CA9176FB6}"/>
                   </a:ext>
                 </a:extLst>
               </p:cNvPr>
@@ -6105,10 +6142,10 @@
         </p:grpSp>
         <p:pic>
           <p:nvPicPr>
-            <p:cNvPr id="41" name="Picture 40" descr="Bar chart&#10;&#10;Description automatically generated with low confidence">
+            <p:cNvPr id="13" name="Picture 12" descr="Bar chart&#10;&#10;Description automatically generated with low confidence">
               <a:extLst>
                 <a:ext uri="{FF2B5EF4-FFF2-40B4-BE49-F238E27FC236}">
-                  <a16:creationId xmlns:a16="http://schemas.microsoft.com/office/drawing/2014/main" id="{42F335AF-1ABA-EBA6-2B03-EC635EACD9E7}"/>
+                  <a16:creationId xmlns:a16="http://schemas.microsoft.com/office/drawing/2014/main" id="{43BF35AF-D1CE-6446-0657-A4856B0BA938}"/>
                 </a:ext>
               </a:extLst>
             </p:cNvPr>
@@ -6138,10 +6175,10 @@
       </p:grpSp>
       <p:grpSp>
         <p:nvGrpSpPr>
-          <p:cNvPr id="47" name="Group 46">
+          <p:cNvPr id="23" name="Group 22">
             <a:extLst>
               <a:ext uri="{FF2B5EF4-FFF2-40B4-BE49-F238E27FC236}">
-                <a16:creationId xmlns:a16="http://schemas.microsoft.com/office/drawing/2014/main" id="{BADC29EF-2C5C-41DD-34DA-68500D9987FA}"/>
+                <a16:creationId xmlns:a16="http://schemas.microsoft.com/office/drawing/2014/main" id="{C734B91E-3CAB-4C8A-D3E3-41FC2EF4338C}"/>
               </a:ext>
             </a:extLst>
           </p:cNvPr>
@@ -6150,7 +6187,7 @@
         </p:nvGrpSpPr>
         <p:grpSpPr>
           <a:xfrm>
-            <a:off x="14420788" y="25272737"/>
+            <a:off x="14329692" y="25454851"/>
             <a:ext cx="6659898" cy="14288688"/>
             <a:chOff x="16763447" y="17290303"/>
             <a:chExt cx="6659898" cy="14288688"/>
@@ -6158,10 +6195,10 @@
         </p:grpSpPr>
         <p:grpSp>
           <p:nvGrpSpPr>
-            <p:cNvPr id="48" name="Group 47">
+            <p:cNvPr id="24" name="Group 23">
               <a:extLst>
                 <a:ext uri="{FF2B5EF4-FFF2-40B4-BE49-F238E27FC236}">
-                  <a16:creationId xmlns:a16="http://schemas.microsoft.com/office/drawing/2014/main" id="{501CC765-AFAC-D815-BE0F-DD0AF798E094}"/>
+                  <a16:creationId xmlns:a16="http://schemas.microsoft.com/office/drawing/2014/main" id="{A2903EBA-B8C7-0123-5121-8C842FD15183}"/>
                 </a:ext>
               </a:extLst>
             </p:cNvPr>
@@ -6178,10 +6215,10 @@
           </p:grpSpPr>
           <p:grpSp>
             <p:nvGrpSpPr>
-              <p:cNvPr id="58" name="Group 57">
+              <p:cNvPr id="27" name="Group 26">
                 <a:extLst>
                   <a:ext uri="{FF2B5EF4-FFF2-40B4-BE49-F238E27FC236}">
-                    <a16:creationId xmlns:a16="http://schemas.microsoft.com/office/drawing/2014/main" id="{74E47E8C-4B90-E6C6-EDBC-05FCF6C00833}"/>
+                    <a16:creationId xmlns:a16="http://schemas.microsoft.com/office/drawing/2014/main" id="{250943E6-D40C-D22B-228B-39F4D948AD37}"/>
                   </a:ext>
                 </a:extLst>
               </p:cNvPr>
@@ -6198,10 +6235,10 @@
             </p:grpSpPr>
             <p:pic>
               <p:nvPicPr>
-                <p:cNvPr id="63" name="Picture 62" descr="Chart&#10;&#10;Description automatically generated">
+                <p:cNvPr id="72" name="Picture 71" descr="Chart&#10;&#10;Description automatically generated">
                   <a:extLst>
                     <a:ext uri="{FF2B5EF4-FFF2-40B4-BE49-F238E27FC236}">
-                      <a16:creationId xmlns:a16="http://schemas.microsoft.com/office/drawing/2014/main" id="{0AE2D47C-BBD3-5B6F-D2AD-B21187868714}"/>
+                      <a16:creationId xmlns:a16="http://schemas.microsoft.com/office/drawing/2014/main" id="{564A6A4E-73A8-704C-71B8-71827F9756B9}"/>
                     </a:ext>
                   </a:extLst>
                 </p:cNvPr>
@@ -6231,10 +6268,10 @@
             </p:pic>
             <p:pic>
               <p:nvPicPr>
-                <p:cNvPr id="64" name="Picture 63" descr="Chart, box and whisker chart&#10;&#10;Description automatically generated">
+                <p:cNvPr id="73" name="Picture 72" descr="Chart, box and whisker chart&#10;&#10;Description automatically generated">
                   <a:extLst>
                     <a:ext uri="{FF2B5EF4-FFF2-40B4-BE49-F238E27FC236}">
-                      <a16:creationId xmlns:a16="http://schemas.microsoft.com/office/drawing/2014/main" id="{5EC61814-820B-76F7-AB26-567A7E74E5A5}"/>
+                      <a16:creationId xmlns:a16="http://schemas.microsoft.com/office/drawing/2014/main" id="{ABED17F4-403B-BC6B-7561-986C58B7C8FD}"/>
                     </a:ext>
                   </a:extLst>
                 </p:cNvPr>
@@ -6260,10 +6297,10 @@
             </p:pic>
             <p:pic>
               <p:nvPicPr>
-                <p:cNvPr id="65" name="Picture 64" descr="Bar chart&#10;&#10;Description automatically generated with low confidence">
+                <p:cNvPr id="74" name="Picture 73" descr="Bar chart&#10;&#10;Description automatically generated with low confidence">
                   <a:extLst>
                     <a:ext uri="{FF2B5EF4-FFF2-40B4-BE49-F238E27FC236}">
-                      <a16:creationId xmlns:a16="http://schemas.microsoft.com/office/drawing/2014/main" id="{3D56DAB8-27CF-63BA-11FB-7486B907E4AD}"/>
+                      <a16:creationId xmlns:a16="http://schemas.microsoft.com/office/drawing/2014/main" id="{3D7BB390-BE01-561D-140F-D0F85DB3AFC6}"/>
                     </a:ext>
                   </a:extLst>
                 </p:cNvPr>
@@ -6292,10 +6329,10 @@
             </p:pic>
             <p:pic>
               <p:nvPicPr>
-                <p:cNvPr id="66" name="Picture 65" descr="Bar chart&#10;&#10;Description automatically generated with low confidence">
+                <p:cNvPr id="75" name="Picture 74" descr="Bar chart&#10;&#10;Description automatically generated with low confidence">
                   <a:extLst>
                     <a:ext uri="{FF2B5EF4-FFF2-40B4-BE49-F238E27FC236}">
-                      <a16:creationId xmlns:a16="http://schemas.microsoft.com/office/drawing/2014/main" id="{DA0CEE8C-C1D1-9344-458B-2FF818AE302F}"/>
+                      <a16:creationId xmlns:a16="http://schemas.microsoft.com/office/drawing/2014/main" id="{92E24846-11B3-A2ED-E89D-8BA16D1169B7}"/>
                     </a:ext>
                   </a:extLst>
                 </p:cNvPr>
@@ -6325,10 +6362,10 @@
           </p:grpSp>
           <p:pic>
             <p:nvPicPr>
-              <p:cNvPr id="62" name="Picture 61" descr="Bar chart&#10;&#10;Description automatically generated with low confidence">
+              <p:cNvPr id="71" name="Picture 70" descr="Bar chart&#10;&#10;Description automatically generated with low confidence">
                 <a:extLst>
                   <a:ext uri="{FF2B5EF4-FFF2-40B4-BE49-F238E27FC236}">
-                    <a16:creationId xmlns:a16="http://schemas.microsoft.com/office/drawing/2014/main" id="{BC23873B-A7A6-E703-D879-B229D6ECB4C6}"/>
+                    <a16:creationId xmlns:a16="http://schemas.microsoft.com/office/drawing/2014/main" id="{9F5801D1-7DC2-7EFA-61C9-0EAB3D958DEE}"/>
                   </a:ext>
                 </a:extLst>
               </p:cNvPr>
@@ -6358,10 +6395,10 @@
         </p:grpSp>
         <p:sp>
           <p:nvSpPr>
-            <p:cNvPr id="50" name="TextBox 49">
+            <p:cNvPr id="26" name="TextBox 25">
               <a:extLst>
                 <a:ext uri="{FF2B5EF4-FFF2-40B4-BE49-F238E27FC236}">
-                  <a16:creationId xmlns:a16="http://schemas.microsoft.com/office/drawing/2014/main" id="{42290A7C-E2D1-C603-F766-46294A3251B1}"/>
+                  <a16:creationId xmlns:a16="http://schemas.microsoft.com/office/drawing/2014/main" id="{85FCA5F9-6F7B-0428-4505-17BACA956A3D}"/>
                 </a:ext>
               </a:extLst>
             </p:cNvPr>
@@ -6395,10 +6432,10 @@
       </p:grpSp>
       <p:sp>
         <p:nvSpPr>
-          <p:cNvPr id="67" name="TextBox 66">
+          <p:cNvPr id="76" name="TextBox 75">
             <a:extLst>
               <a:ext uri="{FF2B5EF4-FFF2-40B4-BE49-F238E27FC236}">
-                <a16:creationId xmlns:a16="http://schemas.microsoft.com/office/drawing/2014/main" id="{3ECCDCB9-1D77-AB7F-989A-C91505C944AA}"/>
+                <a16:creationId xmlns:a16="http://schemas.microsoft.com/office/drawing/2014/main" id="{5D2DEBC4-810F-6F77-5326-F108A09A1DB3}"/>
               </a:ext>
             </a:extLst>
           </p:cNvPr>
@@ -6407,7 +6444,7 @@
         </p:nvSpPr>
         <p:spPr>
           <a:xfrm>
-            <a:off x="945452" y="23929300"/>
+            <a:off x="1057558" y="24111414"/>
             <a:ext cx="6748046" cy="923330"/>
           </a:xfrm>
           <a:prstGeom prst="rect">
@@ -6431,10 +6468,10 @@
       </p:sp>
       <p:sp>
         <p:nvSpPr>
-          <p:cNvPr id="68" name="TextBox 67">
+          <p:cNvPr id="77" name="TextBox 76">
             <a:extLst>
               <a:ext uri="{FF2B5EF4-FFF2-40B4-BE49-F238E27FC236}">
-                <a16:creationId xmlns:a16="http://schemas.microsoft.com/office/drawing/2014/main" id="{4C14BC30-CB13-A241-D652-95E096EFB449}"/>
+                <a16:creationId xmlns:a16="http://schemas.microsoft.com/office/drawing/2014/main" id="{C8ECA00C-AF2A-F6D8-BDDA-8490F76DBB49}"/>
               </a:ext>
             </a:extLst>
           </p:cNvPr>
@@ -6443,7 +6480,7 @@
         </p:nvSpPr>
         <p:spPr>
           <a:xfrm>
-            <a:off x="9311201" y="23929300"/>
+            <a:off x="9423307" y="24111415"/>
             <a:ext cx="3878272" cy="923330"/>
           </a:xfrm>
           <a:prstGeom prst="rect">
@@ -6468,10 +6505,10 @@
       </p:sp>
       <p:sp>
         <p:nvSpPr>
-          <p:cNvPr id="69" name="TextBox 68">
+          <p:cNvPr id="78" name="TextBox 77">
             <a:extLst>
               <a:ext uri="{FF2B5EF4-FFF2-40B4-BE49-F238E27FC236}">
-                <a16:creationId xmlns:a16="http://schemas.microsoft.com/office/drawing/2014/main" id="{5A1300E3-A4EA-B4B1-1DA4-A10D641A3B10}"/>
+                <a16:creationId xmlns:a16="http://schemas.microsoft.com/office/drawing/2014/main" id="{8A6EBB1D-E4B1-0DEB-C69D-A3599000E4F3}"/>
               </a:ext>
             </a:extLst>
           </p:cNvPr>
@@ -6480,7 +6517,7 @@
         </p:nvSpPr>
         <p:spPr>
           <a:xfrm>
-            <a:off x="18821706" y="23900613"/>
+            <a:off x="18933812" y="24082727"/>
             <a:ext cx="4543876" cy="923330"/>
           </a:xfrm>
           <a:prstGeom prst="rect">
@@ -6499,43 +6536,6 @@
               <a:rPr lang="en-US" sz="5400" b="1" dirty="0"/>
               <a:t>All treatments</a:t>
             </a:r>
-          </a:p>
-        </p:txBody>
-      </p:sp>
-      <p:sp>
-        <p:nvSpPr>
-          <p:cNvPr id="70" name="TextBox 69">
-            <a:extLst>
-              <a:ext uri="{FF2B5EF4-FFF2-40B4-BE49-F238E27FC236}">
-                <a16:creationId xmlns:a16="http://schemas.microsoft.com/office/drawing/2014/main" id="{0D9A635C-5091-7F9A-75E0-A2869CE41923}"/>
-              </a:ext>
-            </a:extLst>
-          </p:cNvPr>
-          <p:cNvSpPr txBox="1"/>
-          <p:nvPr/>
-        </p:nvSpPr>
-        <p:spPr>
-          <a:xfrm>
-            <a:off x="9364018" y="21670386"/>
-            <a:ext cx="9636973" cy="1569660"/>
-          </a:xfrm>
-          <a:prstGeom prst="rect">
-            <a:avLst/>
-          </a:prstGeom>
-          <a:noFill/>
-        </p:spPr>
-        <p:txBody>
-          <a:bodyPr wrap="square" rtlCol="0">
-            <a:spAutoFit/>
-          </a:bodyPr>
-          <a:lstStyle/>
-          <a:p>
-            <a:pPr algn="ctr"/>
-            <a:r>
-              <a:rPr lang="en-US" sz="9600" b="1" u="sng" dirty="0"/>
-              <a:t>ASVs Depleted In:</a:t>
-            </a:r>
-            <a:endParaRPr lang="en-US" sz="11500" b="1" u="sng" dirty="0"/>
           </a:p>
         </p:txBody>
       </p:sp>

</xml_diff>